<commit_message>
docs: added pic draft for layer mapping (paper4) and update comparison orchestrator
</commit_message>
<xml_diff>
--- a/slides/Comparison K-O.pptx
+++ b/slides/Comparison K-O.pptx
@@ -154,7 +154,7 @@
           </a:lstStyle>
           <a:p>
             <a:r>
-              <a:rPr lang="en-US" smtClean="0"/>
+              <a:rPr lang="en-US"/>
               <a:t>Click to edit Master title style</a:t>
             </a:r>
             <a:endParaRPr lang="en-GB"/>
@@ -219,7 +219,7 @@
           </a:lstStyle>
           <a:p>
             <a:r>
-              <a:rPr lang="en-US" smtClean="0"/>
+              <a:rPr lang="en-US"/>
               <a:t>Click to edit Master subtitle style</a:t>
             </a:r>
             <a:endParaRPr lang="en-GB"/>
@@ -243,7 +243,7 @@
           <a:p>
             <a:fld id="{E463ECBD-872A-4504-A641-A42C97932560}" type="datetimeFigureOut">
               <a:rPr lang="en-GB" smtClean="0"/>
-              <a:t>03/12/2018</a:t>
+              <a:t>14/11/2019</a:t>
             </a:fld>
             <a:endParaRPr lang="en-GB"/>
           </a:p>
@@ -337,7 +337,7 @@
           <a:lstStyle/>
           <a:p>
             <a:r>
-              <a:rPr lang="en-US" smtClean="0"/>
+              <a:rPr lang="en-US"/>
               <a:t>Click to edit Master title style</a:t>
             </a:r>
             <a:endParaRPr lang="en-GB"/>
@@ -361,35 +361,35 @@
           <a:p>
             <a:pPr lvl="0"/>
             <a:r>
-              <a:rPr lang="en-US" smtClean="0"/>
+              <a:rPr lang="en-US"/>
               <a:t>Edit Master text styles</a:t>
             </a:r>
           </a:p>
           <a:p>
             <a:pPr lvl="1"/>
             <a:r>
-              <a:rPr lang="en-US" smtClean="0"/>
+              <a:rPr lang="en-US"/>
               <a:t>Second level</a:t>
             </a:r>
           </a:p>
           <a:p>
             <a:pPr lvl="2"/>
             <a:r>
-              <a:rPr lang="en-US" smtClean="0"/>
+              <a:rPr lang="en-US"/>
               <a:t>Third level</a:t>
             </a:r>
           </a:p>
           <a:p>
             <a:pPr lvl="3"/>
             <a:r>
-              <a:rPr lang="en-US" smtClean="0"/>
+              <a:rPr lang="en-US"/>
               <a:t>Fourth level</a:t>
             </a:r>
           </a:p>
           <a:p>
             <a:pPr lvl="4"/>
             <a:r>
-              <a:rPr lang="en-US" smtClean="0"/>
+              <a:rPr lang="en-US"/>
               <a:t>Fifth level</a:t>
             </a:r>
             <a:endParaRPr lang="en-GB"/>
@@ -413,7 +413,7 @@
           <a:p>
             <a:fld id="{E463ECBD-872A-4504-A641-A42C97932560}" type="datetimeFigureOut">
               <a:rPr lang="en-GB" smtClean="0"/>
-              <a:t>03/12/2018</a:t>
+              <a:t>14/11/2019</a:t>
             </a:fld>
             <a:endParaRPr lang="en-GB"/>
           </a:p>
@@ -512,7 +512,7 @@
           <a:lstStyle/>
           <a:p>
             <a:r>
-              <a:rPr lang="en-US" smtClean="0"/>
+              <a:rPr lang="en-US"/>
               <a:t>Click to edit Master title style</a:t>
             </a:r>
             <a:endParaRPr lang="en-GB"/>
@@ -541,35 +541,35 @@
           <a:p>
             <a:pPr lvl="0"/>
             <a:r>
-              <a:rPr lang="en-US" smtClean="0"/>
+              <a:rPr lang="en-US"/>
               <a:t>Edit Master text styles</a:t>
             </a:r>
           </a:p>
           <a:p>
             <a:pPr lvl="1"/>
             <a:r>
-              <a:rPr lang="en-US" smtClean="0"/>
+              <a:rPr lang="en-US"/>
               <a:t>Second level</a:t>
             </a:r>
           </a:p>
           <a:p>
             <a:pPr lvl="2"/>
             <a:r>
-              <a:rPr lang="en-US" smtClean="0"/>
+              <a:rPr lang="en-US"/>
               <a:t>Third level</a:t>
             </a:r>
           </a:p>
           <a:p>
             <a:pPr lvl="3"/>
             <a:r>
-              <a:rPr lang="en-US" smtClean="0"/>
+              <a:rPr lang="en-US"/>
               <a:t>Fourth level</a:t>
             </a:r>
           </a:p>
           <a:p>
             <a:pPr lvl="4"/>
             <a:r>
-              <a:rPr lang="en-US" smtClean="0"/>
+              <a:rPr lang="en-US"/>
               <a:t>Fifth level</a:t>
             </a:r>
             <a:endParaRPr lang="en-GB"/>
@@ -593,7 +593,7 @@
           <a:p>
             <a:fld id="{E463ECBD-872A-4504-A641-A42C97932560}" type="datetimeFigureOut">
               <a:rPr lang="en-GB" smtClean="0"/>
-              <a:t>03/12/2018</a:t>
+              <a:t>14/11/2019</a:t>
             </a:fld>
             <a:endParaRPr lang="en-GB"/>
           </a:p>
@@ -687,7 +687,7 @@
           <a:lstStyle/>
           <a:p>
             <a:r>
-              <a:rPr lang="en-US" smtClean="0"/>
+              <a:rPr lang="en-US"/>
               <a:t>Click to edit Master title style</a:t>
             </a:r>
             <a:endParaRPr lang="en-GB"/>
@@ -711,35 +711,35 @@
           <a:p>
             <a:pPr lvl="0"/>
             <a:r>
-              <a:rPr lang="en-US" smtClean="0"/>
+              <a:rPr lang="en-US"/>
               <a:t>Edit Master text styles</a:t>
             </a:r>
           </a:p>
           <a:p>
             <a:pPr lvl="1"/>
             <a:r>
-              <a:rPr lang="en-US" smtClean="0"/>
+              <a:rPr lang="en-US"/>
               <a:t>Second level</a:t>
             </a:r>
           </a:p>
           <a:p>
             <a:pPr lvl="2"/>
             <a:r>
-              <a:rPr lang="en-US" smtClean="0"/>
+              <a:rPr lang="en-US"/>
               <a:t>Third level</a:t>
             </a:r>
           </a:p>
           <a:p>
             <a:pPr lvl="3"/>
             <a:r>
-              <a:rPr lang="en-US" smtClean="0"/>
+              <a:rPr lang="en-US"/>
               <a:t>Fourth level</a:t>
             </a:r>
           </a:p>
           <a:p>
             <a:pPr lvl="4"/>
             <a:r>
-              <a:rPr lang="en-US" smtClean="0"/>
+              <a:rPr lang="en-US"/>
               <a:t>Fifth level</a:t>
             </a:r>
             <a:endParaRPr lang="en-GB"/>
@@ -763,7 +763,7 @@
           <a:p>
             <a:fld id="{E463ECBD-872A-4504-A641-A42C97932560}" type="datetimeFigureOut">
               <a:rPr lang="en-GB" smtClean="0"/>
-              <a:t>03/12/2018</a:t>
+              <a:t>14/11/2019</a:t>
             </a:fld>
             <a:endParaRPr lang="en-GB"/>
           </a:p>
@@ -866,7 +866,7 @@
           </a:lstStyle>
           <a:p>
             <a:r>
-              <a:rPr lang="en-US" smtClean="0"/>
+              <a:rPr lang="en-US"/>
               <a:t>Click to edit Master title style</a:t>
             </a:r>
             <a:endParaRPr lang="en-GB"/>
@@ -986,7 +986,7 @@
           <a:p>
             <a:pPr lvl="0"/>
             <a:r>
-              <a:rPr lang="en-US" smtClean="0"/>
+              <a:rPr lang="en-US"/>
               <a:t>Edit Master text styles</a:t>
             </a:r>
           </a:p>
@@ -1009,7 +1009,7 @@
           <a:p>
             <a:fld id="{E463ECBD-872A-4504-A641-A42C97932560}" type="datetimeFigureOut">
               <a:rPr lang="en-GB" smtClean="0"/>
-              <a:t>03/12/2018</a:t>
+              <a:t>14/11/2019</a:t>
             </a:fld>
             <a:endParaRPr lang="en-GB"/>
           </a:p>
@@ -1103,7 +1103,7 @@
           <a:lstStyle/>
           <a:p>
             <a:r>
-              <a:rPr lang="en-US" smtClean="0"/>
+              <a:rPr lang="en-US"/>
               <a:t>Click to edit Master title style</a:t>
             </a:r>
             <a:endParaRPr lang="en-GB"/>
@@ -1132,35 +1132,35 @@
           <a:p>
             <a:pPr lvl="0"/>
             <a:r>
-              <a:rPr lang="en-US" smtClean="0"/>
+              <a:rPr lang="en-US"/>
               <a:t>Edit Master text styles</a:t>
             </a:r>
           </a:p>
           <a:p>
             <a:pPr lvl="1"/>
             <a:r>
-              <a:rPr lang="en-US" smtClean="0"/>
+              <a:rPr lang="en-US"/>
               <a:t>Second level</a:t>
             </a:r>
           </a:p>
           <a:p>
             <a:pPr lvl="2"/>
             <a:r>
-              <a:rPr lang="en-US" smtClean="0"/>
+              <a:rPr lang="en-US"/>
               <a:t>Third level</a:t>
             </a:r>
           </a:p>
           <a:p>
             <a:pPr lvl="3"/>
             <a:r>
-              <a:rPr lang="en-US" smtClean="0"/>
+              <a:rPr lang="en-US"/>
               <a:t>Fourth level</a:t>
             </a:r>
           </a:p>
           <a:p>
             <a:pPr lvl="4"/>
             <a:r>
-              <a:rPr lang="en-US" smtClean="0"/>
+              <a:rPr lang="en-US"/>
               <a:t>Fifth level</a:t>
             </a:r>
             <a:endParaRPr lang="en-GB"/>
@@ -1189,35 +1189,35 @@
           <a:p>
             <a:pPr lvl="0"/>
             <a:r>
-              <a:rPr lang="en-US" smtClean="0"/>
+              <a:rPr lang="en-US"/>
               <a:t>Edit Master text styles</a:t>
             </a:r>
           </a:p>
           <a:p>
             <a:pPr lvl="1"/>
             <a:r>
-              <a:rPr lang="en-US" smtClean="0"/>
+              <a:rPr lang="en-US"/>
               <a:t>Second level</a:t>
             </a:r>
           </a:p>
           <a:p>
             <a:pPr lvl="2"/>
             <a:r>
-              <a:rPr lang="en-US" smtClean="0"/>
+              <a:rPr lang="en-US"/>
               <a:t>Third level</a:t>
             </a:r>
           </a:p>
           <a:p>
             <a:pPr lvl="3"/>
             <a:r>
-              <a:rPr lang="en-US" smtClean="0"/>
+              <a:rPr lang="en-US"/>
               <a:t>Fourth level</a:t>
             </a:r>
           </a:p>
           <a:p>
             <a:pPr lvl="4"/>
             <a:r>
-              <a:rPr lang="en-US" smtClean="0"/>
+              <a:rPr lang="en-US"/>
               <a:t>Fifth level</a:t>
             </a:r>
             <a:endParaRPr lang="en-GB"/>
@@ -1241,7 +1241,7 @@
           <a:p>
             <a:fld id="{E463ECBD-872A-4504-A641-A42C97932560}" type="datetimeFigureOut">
               <a:rPr lang="en-GB" smtClean="0"/>
-              <a:t>03/12/2018</a:t>
+              <a:t>14/11/2019</a:t>
             </a:fld>
             <a:endParaRPr lang="en-GB"/>
           </a:p>
@@ -1340,7 +1340,7 @@
           <a:lstStyle/>
           <a:p>
             <a:r>
-              <a:rPr lang="en-US" smtClean="0"/>
+              <a:rPr lang="en-US"/>
               <a:t>Click to edit Master title style</a:t>
             </a:r>
             <a:endParaRPr lang="en-GB"/>
@@ -1406,7 +1406,7 @@
           <a:p>
             <a:pPr lvl="0"/>
             <a:r>
-              <a:rPr lang="en-US" smtClean="0"/>
+              <a:rPr lang="en-US"/>
               <a:t>Edit Master text styles</a:t>
             </a:r>
           </a:p>
@@ -1434,35 +1434,35 @@
           <a:p>
             <a:pPr lvl="0"/>
             <a:r>
-              <a:rPr lang="en-US" smtClean="0"/>
+              <a:rPr lang="en-US"/>
               <a:t>Edit Master text styles</a:t>
             </a:r>
           </a:p>
           <a:p>
             <a:pPr lvl="1"/>
             <a:r>
-              <a:rPr lang="en-US" smtClean="0"/>
+              <a:rPr lang="en-US"/>
               <a:t>Second level</a:t>
             </a:r>
           </a:p>
           <a:p>
             <a:pPr lvl="2"/>
             <a:r>
-              <a:rPr lang="en-US" smtClean="0"/>
+              <a:rPr lang="en-US"/>
               <a:t>Third level</a:t>
             </a:r>
           </a:p>
           <a:p>
             <a:pPr lvl="3"/>
             <a:r>
-              <a:rPr lang="en-US" smtClean="0"/>
+              <a:rPr lang="en-US"/>
               <a:t>Fourth level</a:t>
             </a:r>
           </a:p>
           <a:p>
             <a:pPr lvl="4"/>
             <a:r>
-              <a:rPr lang="en-US" smtClean="0"/>
+              <a:rPr lang="en-US"/>
               <a:t>Fifth level</a:t>
             </a:r>
             <a:endParaRPr lang="en-GB"/>
@@ -1528,7 +1528,7 @@
           <a:p>
             <a:pPr lvl="0"/>
             <a:r>
-              <a:rPr lang="en-US" smtClean="0"/>
+              <a:rPr lang="en-US"/>
               <a:t>Edit Master text styles</a:t>
             </a:r>
           </a:p>
@@ -1556,35 +1556,35 @@
           <a:p>
             <a:pPr lvl="0"/>
             <a:r>
-              <a:rPr lang="en-US" smtClean="0"/>
+              <a:rPr lang="en-US"/>
               <a:t>Edit Master text styles</a:t>
             </a:r>
           </a:p>
           <a:p>
             <a:pPr lvl="1"/>
             <a:r>
-              <a:rPr lang="en-US" smtClean="0"/>
+              <a:rPr lang="en-US"/>
               <a:t>Second level</a:t>
             </a:r>
           </a:p>
           <a:p>
             <a:pPr lvl="2"/>
             <a:r>
-              <a:rPr lang="en-US" smtClean="0"/>
+              <a:rPr lang="en-US"/>
               <a:t>Third level</a:t>
             </a:r>
           </a:p>
           <a:p>
             <a:pPr lvl="3"/>
             <a:r>
-              <a:rPr lang="en-US" smtClean="0"/>
+              <a:rPr lang="en-US"/>
               <a:t>Fourth level</a:t>
             </a:r>
           </a:p>
           <a:p>
             <a:pPr lvl="4"/>
             <a:r>
-              <a:rPr lang="en-US" smtClean="0"/>
+              <a:rPr lang="en-US"/>
               <a:t>Fifth level</a:t>
             </a:r>
             <a:endParaRPr lang="en-GB"/>
@@ -1608,7 +1608,7 @@
           <a:p>
             <a:fld id="{E463ECBD-872A-4504-A641-A42C97932560}" type="datetimeFigureOut">
               <a:rPr lang="en-GB" smtClean="0"/>
-              <a:t>03/12/2018</a:t>
+              <a:t>14/11/2019</a:t>
             </a:fld>
             <a:endParaRPr lang="en-GB"/>
           </a:p>
@@ -1702,7 +1702,7 @@
           <a:lstStyle/>
           <a:p>
             <a:r>
-              <a:rPr lang="en-US" smtClean="0"/>
+              <a:rPr lang="en-US"/>
               <a:t>Click to edit Master title style</a:t>
             </a:r>
             <a:endParaRPr lang="en-GB"/>
@@ -1726,7 +1726,7 @@
           <a:p>
             <a:fld id="{E463ECBD-872A-4504-A641-A42C97932560}" type="datetimeFigureOut">
               <a:rPr lang="en-GB" smtClean="0"/>
-              <a:t>03/12/2018</a:t>
+              <a:t>14/11/2019</a:t>
             </a:fld>
             <a:endParaRPr lang="en-GB"/>
           </a:p>
@@ -1821,7 +1821,7 @@
           <a:p>
             <a:fld id="{E463ECBD-872A-4504-A641-A42C97932560}" type="datetimeFigureOut">
               <a:rPr lang="en-GB" smtClean="0"/>
-              <a:t>03/12/2018</a:t>
+              <a:t>14/11/2019</a:t>
             </a:fld>
             <a:endParaRPr lang="en-GB"/>
           </a:p>
@@ -1924,7 +1924,7 @@
           </a:lstStyle>
           <a:p>
             <a:r>
-              <a:rPr lang="en-US" smtClean="0"/>
+              <a:rPr lang="en-US"/>
               <a:t>Click to edit Master title style</a:t>
             </a:r>
             <a:endParaRPr lang="en-GB"/>
@@ -1981,35 +1981,35 @@
           <a:p>
             <a:pPr lvl="0"/>
             <a:r>
-              <a:rPr lang="en-US" smtClean="0"/>
+              <a:rPr lang="en-US"/>
               <a:t>Edit Master text styles</a:t>
             </a:r>
           </a:p>
           <a:p>
             <a:pPr lvl="1"/>
             <a:r>
-              <a:rPr lang="en-US" smtClean="0"/>
+              <a:rPr lang="en-US"/>
               <a:t>Second level</a:t>
             </a:r>
           </a:p>
           <a:p>
             <a:pPr lvl="2"/>
             <a:r>
-              <a:rPr lang="en-US" smtClean="0"/>
+              <a:rPr lang="en-US"/>
               <a:t>Third level</a:t>
             </a:r>
           </a:p>
           <a:p>
             <a:pPr lvl="3"/>
             <a:r>
-              <a:rPr lang="en-US" smtClean="0"/>
+              <a:rPr lang="en-US"/>
               <a:t>Fourth level</a:t>
             </a:r>
           </a:p>
           <a:p>
             <a:pPr lvl="4"/>
             <a:r>
-              <a:rPr lang="en-US" smtClean="0"/>
+              <a:rPr lang="en-US"/>
               <a:t>Fifth level</a:t>
             </a:r>
             <a:endParaRPr lang="en-GB"/>
@@ -2075,7 +2075,7 @@
           <a:p>
             <a:pPr lvl="0"/>
             <a:r>
-              <a:rPr lang="en-US" smtClean="0"/>
+              <a:rPr lang="en-US"/>
               <a:t>Edit Master text styles</a:t>
             </a:r>
           </a:p>
@@ -2098,7 +2098,7 @@
           <a:p>
             <a:fld id="{E463ECBD-872A-4504-A641-A42C97932560}" type="datetimeFigureOut">
               <a:rPr lang="en-GB" smtClean="0"/>
-              <a:t>03/12/2018</a:t>
+              <a:t>14/11/2019</a:t>
             </a:fld>
             <a:endParaRPr lang="en-GB"/>
           </a:p>
@@ -2201,7 +2201,7 @@
           </a:lstStyle>
           <a:p>
             <a:r>
-              <a:rPr lang="en-US" smtClean="0"/>
+              <a:rPr lang="en-US"/>
               <a:t>Click to edit Master title style</a:t>
             </a:r>
             <a:endParaRPr lang="en-GB"/>
@@ -2328,7 +2328,7 @@
           <a:p>
             <a:pPr lvl="0"/>
             <a:r>
-              <a:rPr lang="en-US" smtClean="0"/>
+              <a:rPr lang="en-US"/>
               <a:t>Edit Master text styles</a:t>
             </a:r>
           </a:p>
@@ -2351,7 +2351,7 @@
           <a:p>
             <a:fld id="{E463ECBD-872A-4504-A641-A42C97932560}" type="datetimeFigureOut">
               <a:rPr lang="en-GB" smtClean="0"/>
-              <a:t>03/12/2018</a:t>
+              <a:t>14/11/2019</a:t>
             </a:fld>
             <a:endParaRPr lang="en-GB"/>
           </a:p>
@@ -2460,7 +2460,7 @@
           <a:lstStyle/>
           <a:p>
             <a:r>
-              <a:rPr lang="en-US" smtClean="0"/>
+              <a:rPr lang="en-US"/>
               <a:t>Click to edit Master title style</a:t>
             </a:r>
             <a:endParaRPr lang="en-GB"/>
@@ -2494,35 +2494,35 @@
           <a:p>
             <a:pPr lvl="0"/>
             <a:r>
-              <a:rPr lang="en-US" smtClean="0"/>
+              <a:rPr lang="en-US"/>
               <a:t>Edit Master text styles</a:t>
             </a:r>
           </a:p>
           <a:p>
             <a:pPr lvl="1"/>
             <a:r>
-              <a:rPr lang="en-US" smtClean="0"/>
+              <a:rPr lang="en-US"/>
               <a:t>Second level</a:t>
             </a:r>
           </a:p>
           <a:p>
             <a:pPr lvl="2"/>
             <a:r>
-              <a:rPr lang="en-US" smtClean="0"/>
+              <a:rPr lang="en-US"/>
               <a:t>Third level</a:t>
             </a:r>
           </a:p>
           <a:p>
             <a:pPr lvl="3"/>
             <a:r>
-              <a:rPr lang="en-US" smtClean="0"/>
+              <a:rPr lang="en-US"/>
               <a:t>Fourth level</a:t>
             </a:r>
           </a:p>
           <a:p>
             <a:pPr lvl="4"/>
             <a:r>
-              <a:rPr lang="en-US" smtClean="0"/>
+              <a:rPr lang="en-US"/>
               <a:t>Fifth level</a:t>
             </a:r>
             <a:endParaRPr lang="en-GB"/>
@@ -2564,7 +2564,7 @@
           <a:p>
             <a:fld id="{E463ECBD-872A-4504-A641-A42C97932560}" type="datetimeFigureOut">
               <a:rPr lang="en-GB" smtClean="0"/>
-              <a:t>03/12/2018</a:t>
+              <a:t>14/11/2019</a:t>
             </a:fld>
             <a:endParaRPr lang="en-GB"/>
           </a:p>
@@ -2992,30 +2992,18 @@
           <a:lstStyle/>
           <a:p>
             <a:pPr algn="ctr"/>
-            <a:r>
-              <a:rPr lang="en-US" dirty="0" smtClean="0"/>
-              <a:t/>
-            </a:r>
             <a:br>
-              <a:rPr lang="en-US" dirty="0" smtClean="0"/>
+              <a:rPr lang="en-US" dirty="0"/>
             </a:br>
             <a:r>
-              <a:rPr lang="en-US" b="1" dirty="0" smtClean="0"/>
+              <a:rPr lang="en-US" b="1" dirty="0"/>
               <a:t>Comparison Kubernetes vs. Orchestrator</a:t>
             </a:r>
-            <a:r>
-              <a:rPr lang="en-US" dirty="0" smtClean="0"/>
-              <a:t/>
-            </a:r>
             <a:br>
-              <a:rPr lang="en-US" dirty="0" smtClean="0"/>
+              <a:rPr lang="en-US" dirty="0"/>
             </a:br>
-            <a:r>
-              <a:rPr lang="en-US" dirty="0" smtClean="0"/>
-              <a:t/>
-            </a:r>
             <a:br>
-              <a:rPr lang="en-US" dirty="0" smtClean="0"/>
+              <a:rPr lang="en-US" dirty="0"/>
             </a:br>
             <a:endParaRPr lang="en-GB" dirty="0"/>
           </a:p>
@@ -3033,18 +3021,18 @@
         </p:nvSpPr>
         <p:spPr>
           <a:xfrm>
-            <a:off x="839788" y="2057400"/>
-            <a:ext cx="4810999" cy="3811588"/>
+            <a:off x="839788" y="1266738"/>
+            <a:ext cx="4810999" cy="5301842"/>
           </a:xfrm>
         </p:spPr>
         <p:txBody>
           <a:bodyPr>
-            <a:normAutofit lnSpcReduction="10000"/>
+            <a:normAutofit/>
           </a:bodyPr>
           <a:lstStyle/>
           <a:p>
             <a:r>
-              <a:rPr lang="en-US" dirty="0" smtClean="0"/>
+              <a:rPr lang="en-US" dirty="0"/>
               <a:t>Kubernetes:</a:t>
             </a:r>
           </a:p>
@@ -3054,7 +3042,7 @@
               <a:buChar char="•"/>
             </a:pPr>
             <a:r>
-              <a:rPr lang="en-US" dirty="0" smtClean="0"/>
+              <a:rPr lang="en-US" dirty="0"/>
               <a:t>Allocates pods (and their containers) on nodes based on the required resources and/or tags</a:t>
             </a:r>
           </a:p>
@@ -3064,7 +3052,7 @@
               <a:buChar char="•"/>
             </a:pPr>
             <a:r>
-              <a:rPr lang="en-US" dirty="0" smtClean="0"/>
+              <a:rPr lang="en-US" dirty="0"/>
               <a:t>Limits the maximum CPU-time and memory of a container and a pod according to static configuration</a:t>
             </a:r>
           </a:p>
@@ -3074,18 +3062,13 @@
               <a:buChar char="•"/>
             </a:pPr>
             <a:r>
-              <a:rPr lang="en-US" dirty="0" smtClean="0"/>
-              <a:t>May reallocate a pod’s container to an </a:t>
-            </a:r>
-            <a:r>
-              <a:rPr lang="en-US" dirty="0" smtClean="0"/>
-              <a:t>other node if needed</a:t>
-            </a:r>
-            <a:endParaRPr lang="en-US" dirty="0" smtClean="0"/>
-          </a:p>
-          <a:p>
-            <a:r>
-              <a:rPr lang="en-US" dirty="0" smtClean="0"/>
+              <a:rPr lang="en-US" dirty="0"/>
+              <a:t>May reallocate a pod’s container to an other node if needed</a:t>
+            </a:r>
+          </a:p>
+          <a:p>
+            <a:r>
+              <a:rPr lang="en-US" dirty="0"/>
               <a:t>Orchestrator:</a:t>
             </a:r>
           </a:p>
@@ -3095,8 +3078,16 @@
               <a:buChar char="•"/>
             </a:pPr>
             <a:r>
-              <a:rPr lang="en-US" dirty="0" smtClean="0"/>
-              <a:t>Manages containers on local resources (CPU scheduling)</a:t>
+              <a:rPr lang="en-US" dirty="0"/>
+              <a:t>Manages containers on local resources (CPU scheduling), configures the system and resources such as </a:t>
+            </a:r>
+            <a:r>
+              <a:rPr lang="en-US" dirty="0" err="1"/>
+              <a:t>softIRQs</a:t>
+            </a:r>
+            <a:r>
+              <a:rPr lang="en-US" dirty="0"/>
+              <a:t> and other latency-causing factors</a:t>
             </a:r>
           </a:p>
           <a:p>
@@ -3105,8 +3096,8 @@
               <a:buChar char="•"/>
             </a:pPr>
             <a:r>
-              <a:rPr lang="en-US" dirty="0" smtClean="0"/>
-              <a:t>Monitors real-time behavior and reallocates local resources during runtime if needed</a:t>
+              <a:rPr lang="en-US" dirty="0"/>
+              <a:t>Monitors real-time behavior and reallocates local resources during runtime to maintain determinism if needed</a:t>
             </a:r>
           </a:p>
           <a:p>
@@ -3115,13 +3106,34 @@
               <a:buChar char="•"/>
             </a:pPr>
             <a:r>
-              <a:rPr lang="en-US" dirty="0" smtClean="0"/>
+              <a:rPr lang="en-US" dirty="0"/>
               <a:t>Tries to manage CPU-time on a node while keeping low firing latency for real-time applications</a:t>
             </a:r>
-            <a:endParaRPr lang="en-US" dirty="0" smtClean="0"/>
-          </a:p>
-          <a:p>
-            <a:endParaRPr lang="en-US" dirty="0" smtClean="0"/>
+          </a:p>
+          <a:p>
+            <a:pPr marL="285750" indent="-285750">
+              <a:buFont typeface="Arial" panose="020B0604020202020204" pitchFamily="34" charset="0"/>
+              <a:buChar char="•"/>
+            </a:pPr>
+            <a:r>
+              <a:rPr lang="en-US" i="1" dirty="0"/>
+              <a:t>Possibility</a:t>
+            </a:r>
+            <a:r>
+              <a:rPr lang="en-US" dirty="0"/>
+              <a:t> to create a plugin for </a:t>
+            </a:r>
+            <a:r>
+              <a:rPr lang="en-US" b="1" i="1" dirty="0" err="1"/>
+              <a:t>containerd</a:t>
+            </a:r>
+            <a:r>
+              <a:rPr lang="en-US" dirty="0"/>
+              <a:t> to integrate orchestration into Kubernetes seamlessly</a:t>
+            </a:r>
+          </a:p>
+          <a:p>
+            <a:endParaRPr lang="en-US" dirty="0"/>
           </a:p>
           <a:p>
             <a:pPr marL="285750" indent="-285750">
@@ -3156,14 +3168,20 @@
         </p:blipFill>
         <p:spPr>
           <a:xfrm>
-            <a:off x="6038754" y="1601274"/>
+            <a:off x="5973673" y="1629749"/>
             <a:ext cx="5378539" cy="3002881"/>
           </a:xfrm>
         </p:spPr>
       </p:pic>
       <p:pic>
         <p:nvPicPr>
-          <p:cNvPr id="10" name="Picture Placeholder 2"/>
+          <p:cNvPr id="7" name="Picture 6">
+            <a:extLst>
+              <a:ext uri="{FF2B5EF4-FFF2-40B4-BE49-F238E27FC236}">
+                <a16:creationId xmlns:a16="http://schemas.microsoft.com/office/drawing/2014/main" id="{423D1AF3-EA37-4778-97D6-11AE7CFB0D8E}"/>
+              </a:ext>
+            </a:extLst>
+          </p:cNvPr>
           <p:cNvPicPr>
             <a:picLocks noChangeAspect="1"/>
           </p:cNvPicPr>
@@ -3183,19 +3201,50 @@
         </p:blipFill>
         <p:spPr>
           <a:xfrm>
-            <a:off x="6038754" y="4604155"/>
-            <a:ext cx="4284000" cy="1049580"/>
+            <a:off x="5973673" y="4956775"/>
+            <a:ext cx="5301131" cy="845396"/>
           </a:xfrm>
           <a:prstGeom prst="rect">
             <a:avLst/>
           </a:prstGeom>
-          <a:effectLst>
-            <a:glow>
-              <a:schemeClr val="bg1"/>
-            </a:glow>
-          </a:effectLst>
         </p:spPr>
       </p:pic>
+      <p:sp>
+        <p:nvSpPr>
+          <p:cNvPr id="8" name="TextBox 7">
+            <a:extLst>
+              <a:ext uri="{FF2B5EF4-FFF2-40B4-BE49-F238E27FC236}">
+                <a16:creationId xmlns:a16="http://schemas.microsoft.com/office/drawing/2014/main" id="{895CA970-E66B-4608-8BCD-D8501E884E9A}"/>
+              </a:ext>
+            </a:extLst>
+          </p:cNvPr>
+          <p:cNvSpPr txBox="1"/>
+          <p:nvPr/>
+        </p:nvSpPr>
+        <p:spPr>
+          <a:xfrm>
+            <a:off x="7315201" y="5947794"/>
+            <a:ext cx="3095538" cy="307777"/>
+          </a:xfrm>
+          <a:prstGeom prst="rect">
+            <a:avLst/>
+          </a:prstGeom>
+          <a:noFill/>
+        </p:spPr>
+        <p:txBody>
+          <a:bodyPr wrap="square" rtlCol="0">
+            <a:spAutoFit/>
+          </a:bodyPr>
+          <a:lstStyle/>
+          <a:p>
+            <a:pPr algn="ctr"/>
+            <a:r>
+              <a:rPr lang="en-US" sz="1400" dirty="0"/>
+              <a:t>New Kubernetes cri</a:t>
+            </a:r>
+          </a:p>
+        </p:txBody>
+      </p:sp>
     </p:spTree>
     <p:extLst>
       <p:ext uri="{BB962C8B-B14F-4D97-AF65-F5344CB8AC3E}">

</xml_diff>